<commit_message>
Simulations complete; sent first draft of ms to coauthors
</commit_message>
<xml_diff>
--- a/manuscript/DAG.pptx
+++ b/manuscript/DAG.pptx
@@ -289,7 +289,7 @@
             <a:fld id="{D96B8624-A8EC-43EC-8337-4B3E96291216}" type="datetimeFigureOut">
               <a:rPr lang="en-US" smtClean="0"/>
               <a:pPr/>
-              <a:t>10/3/2011</a:t>
+              <a:t>1/25/2012</a:t>
             </a:fld>
             <a:endParaRPr lang="en-US"/>
           </a:p>
@@ -456,7 +456,7 @@
             <a:fld id="{D96B8624-A8EC-43EC-8337-4B3E96291216}" type="datetimeFigureOut">
               <a:rPr lang="en-US" smtClean="0"/>
               <a:pPr/>
-              <a:t>10/3/2011</a:t>
+              <a:t>1/25/2012</a:t>
             </a:fld>
             <a:endParaRPr lang="en-US"/>
           </a:p>
@@ -633,7 +633,7 @@
             <a:fld id="{D96B8624-A8EC-43EC-8337-4B3E96291216}" type="datetimeFigureOut">
               <a:rPr lang="en-US" smtClean="0"/>
               <a:pPr/>
-              <a:t>10/3/2011</a:t>
+              <a:t>1/25/2012</a:t>
             </a:fld>
             <a:endParaRPr lang="en-US"/>
           </a:p>
@@ -800,7 +800,7 @@
             <a:fld id="{D96B8624-A8EC-43EC-8337-4B3E96291216}" type="datetimeFigureOut">
               <a:rPr lang="en-US" smtClean="0"/>
               <a:pPr/>
-              <a:t>10/3/2011</a:t>
+              <a:t>1/25/2012</a:t>
             </a:fld>
             <a:endParaRPr lang="en-US"/>
           </a:p>
@@ -1043,7 +1043,7 @@
             <a:fld id="{D96B8624-A8EC-43EC-8337-4B3E96291216}" type="datetimeFigureOut">
               <a:rPr lang="en-US" smtClean="0"/>
               <a:pPr/>
-              <a:t>10/3/2011</a:t>
+              <a:t>1/25/2012</a:t>
             </a:fld>
             <a:endParaRPr lang="en-US"/>
           </a:p>
@@ -1328,7 +1328,7 @@
             <a:fld id="{D96B8624-A8EC-43EC-8337-4B3E96291216}" type="datetimeFigureOut">
               <a:rPr lang="en-US" smtClean="0"/>
               <a:pPr/>
-              <a:t>10/3/2011</a:t>
+              <a:t>1/25/2012</a:t>
             </a:fld>
             <a:endParaRPr lang="en-US"/>
           </a:p>
@@ -1747,7 +1747,7 @@
             <a:fld id="{D96B8624-A8EC-43EC-8337-4B3E96291216}" type="datetimeFigureOut">
               <a:rPr lang="en-US" smtClean="0"/>
               <a:pPr/>
-              <a:t>10/3/2011</a:t>
+              <a:t>1/25/2012</a:t>
             </a:fld>
             <a:endParaRPr lang="en-US"/>
           </a:p>
@@ -1862,7 +1862,7 @@
             <a:fld id="{D96B8624-A8EC-43EC-8337-4B3E96291216}" type="datetimeFigureOut">
               <a:rPr lang="en-US" smtClean="0"/>
               <a:pPr/>
-              <a:t>10/3/2011</a:t>
+              <a:t>1/25/2012</a:t>
             </a:fld>
             <a:endParaRPr lang="en-US"/>
           </a:p>
@@ -1954,7 +1954,7 @@
             <a:fld id="{D96B8624-A8EC-43EC-8337-4B3E96291216}" type="datetimeFigureOut">
               <a:rPr lang="en-US" smtClean="0"/>
               <a:pPr/>
-              <a:t>10/3/2011</a:t>
+              <a:t>1/25/2012</a:t>
             </a:fld>
             <a:endParaRPr lang="en-US"/>
           </a:p>
@@ -2228,7 +2228,7 @@
             <a:fld id="{D96B8624-A8EC-43EC-8337-4B3E96291216}" type="datetimeFigureOut">
               <a:rPr lang="en-US" smtClean="0"/>
               <a:pPr/>
-              <a:t>10/3/2011</a:t>
+              <a:t>1/25/2012</a:t>
             </a:fld>
             <a:endParaRPr lang="en-US"/>
           </a:p>
@@ -2478,7 +2478,7 @@
             <a:fld id="{D96B8624-A8EC-43EC-8337-4B3E96291216}" type="datetimeFigureOut">
               <a:rPr lang="en-US" smtClean="0"/>
               <a:pPr/>
-              <a:t>10/3/2011</a:t>
+              <a:t>1/25/2012</a:t>
             </a:fld>
             <a:endParaRPr lang="en-US"/>
           </a:p>
@@ -2688,7 +2688,7 @@
             <a:fld id="{D96B8624-A8EC-43EC-8337-4B3E96291216}" type="datetimeFigureOut">
               <a:rPr lang="en-US" smtClean="0"/>
               <a:pPr/>
-              <a:t>10/3/2011</a:t>
+              <a:t>1/25/2012</a:t>
             </a:fld>
             <a:endParaRPr lang="en-US"/>
           </a:p>
@@ -3252,12 +3252,12 @@
           <p:nvPr/>
         </p:nvGraphicFramePr>
         <p:xfrm>
-          <a:off x="2514600" y="1447800"/>
-          <a:ext cx="550332" cy="450272"/>
+          <a:off x="2501900" y="1447800"/>
+          <a:ext cx="576263" cy="450850"/>
         </p:xfrm>
         <a:graphic>
           <a:graphicData uri="http://schemas.openxmlformats.org/presentationml/2006/ole">
-            <p:oleObj spid="_x0000_s1026" name="Equation" r:id="rId3" imgW="279360" imgH="228600" progId="Equation.3">
+            <p:oleObj spid="_x0000_s1026" name="Equation" r:id="rId3" imgW="291960" imgH="228600" progId="Equation.3">
               <p:embed/>
             </p:oleObj>
           </a:graphicData>
@@ -3272,12 +3272,12 @@
           <p:nvPr/>
         </p:nvGraphicFramePr>
         <p:xfrm>
-          <a:off x="685800" y="609600"/>
-          <a:ext cx="500063" cy="450850"/>
+          <a:off x="685800" y="633413"/>
+          <a:ext cx="500063" cy="401637"/>
         </p:xfrm>
         <a:graphic>
           <a:graphicData uri="http://schemas.openxmlformats.org/presentationml/2006/ole">
-            <p:oleObj spid="_x0000_s1027" name="Equation" r:id="rId4" imgW="253800" imgH="228600" progId="Equation.3">
+            <p:oleObj spid="_x0000_s1027" name="Equation" r:id="rId4" imgW="253800" imgH="203040" progId="Equation.3">
               <p:embed/>
             </p:oleObj>
           </a:graphicData>
@@ -3454,9 +3454,7 @@
           <a:noFill/>
           <a:ln>
             <a:solidFill>
-              <a:schemeClr val="bg2">
-                <a:lumMod val="50000"/>
-              </a:schemeClr>
+              <a:srgbClr val="0070C0"/>
             </a:solidFill>
             <a:prstDash val="dash"/>
           </a:ln>
@@ -3511,18 +3509,14 @@
             <a:r>
               <a:rPr lang="en-US" i="1" dirty="0" smtClean="0">
                 <a:solidFill>
-                  <a:schemeClr val="bg2">
-                    <a:lumMod val="25000"/>
-                  </a:schemeClr>
+                  <a:srgbClr val="0070C0"/>
                 </a:solidFill>
               </a:rPr>
               <a:t>Spatial process model(ICAR)</a:t>
             </a:r>
             <a:endParaRPr lang="en-US" i="1" dirty="0">
               <a:solidFill>
-                <a:schemeClr val="bg2">
-                  <a:lumMod val="25000"/>
-                </a:schemeClr>
+                <a:srgbClr val="0070C0"/>
               </a:solidFill>
             </a:endParaRPr>
           </a:p>
@@ -4031,7 +4025,7 @@
           <a:prstGeom prst="straightConnector1">
             <a:avLst/>
           </a:prstGeom>
-          <a:ln w="25400" cmpd="dbl">
+          <a:ln w="25400" cmpd="sng">
             <a:solidFill>
               <a:schemeClr val="tx1"/>
             </a:solidFill>
@@ -4252,12 +4246,12 @@
           <p:nvPr/>
         </p:nvGraphicFramePr>
         <p:xfrm>
-          <a:off x="6477000" y="4648200"/>
-          <a:ext cx="498475" cy="446087"/>
+          <a:off x="6453188" y="4648200"/>
+          <a:ext cx="547687" cy="446088"/>
         </p:xfrm>
         <a:graphic>
           <a:graphicData uri="http://schemas.openxmlformats.org/presentationml/2006/ole">
-            <p:oleObj spid="_x0000_s1037" name="Equation" r:id="rId13" imgW="253800" imgH="228600" progId="Equation.3">
+            <p:oleObj spid="_x0000_s1037" name="Equation" r:id="rId13" imgW="279360" imgH="228600" progId="Equation.3">
               <p:embed/>
             </p:oleObj>
           </a:graphicData>
@@ -4568,9 +4562,7 @@
           <a:noFill/>
           <a:ln>
             <a:solidFill>
-              <a:schemeClr val="bg1">
-                <a:lumMod val="75000"/>
-              </a:schemeClr>
+              <a:srgbClr val="FF0000"/>
             </a:solidFill>
             <a:prstDash val="dash"/>
           </a:ln>
@@ -4625,9 +4617,7 @@
             <a:r>
               <a:rPr lang="en-US" i="1" dirty="0" smtClean="0">
                 <a:solidFill>
-                  <a:schemeClr val="bg1">
-                    <a:lumMod val="65000"/>
-                  </a:schemeClr>
+                  <a:srgbClr val="FF0000"/>
                 </a:solidFill>
               </a:rPr>
               <a:t>Individual</a:t>
@@ -4637,9 +4627,7 @@
             <a:r>
               <a:rPr lang="en-US" i="1" dirty="0" smtClean="0">
                 <a:solidFill>
-                  <a:schemeClr val="bg1">
-                    <a:lumMod val="65000"/>
-                  </a:schemeClr>
+                  <a:srgbClr val="FF0000"/>
                 </a:solidFill>
               </a:rPr>
               <a:t>covariate</a:t>
@@ -4649,18 +4637,14 @@
             <a:r>
               <a:rPr lang="en-US" i="1" dirty="0" smtClean="0">
                 <a:solidFill>
-                  <a:schemeClr val="bg1">
-                    <a:lumMod val="65000"/>
-                  </a:schemeClr>
+                  <a:srgbClr val="FF0000"/>
                 </a:solidFill>
               </a:rPr>
               <a:t>model</a:t>
             </a:r>
             <a:endParaRPr lang="en-US" i="1" dirty="0">
               <a:solidFill>
-                <a:schemeClr val="bg1">
-                  <a:lumMod val="65000"/>
-                </a:schemeClr>
+                <a:srgbClr val="FF0000"/>
               </a:solidFill>
             </a:endParaRPr>
           </a:p>

</xml_diff>